<commit_message>
update prompts and templates
</commit_message>
<xml_diff>
--- a/highlight/data/highlight_template.pptx
+++ b/highlight/data/highlight_template.pptx
@@ -280,7 +280,7 @@
               <a:pPr>
                 <a:defRPr/>
               </a:pPr>
-              <a:t>9/25/24</a:t>
+              <a:t>10/8/24</a:t>
             </a:fld>
             <a:endParaRPr lang="en-US" dirty="0"/>
           </a:p>
@@ -1057,7 +1057,7 @@
               <a:pPr>
                 <a:defRPr/>
               </a:pPr>
-              <a:t>9/25/24</a:t>
+              <a:t>10/8/24</a:t>
             </a:fld>
             <a:endParaRPr lang="en-US" dirty="0"/>
           </a:p>
@@ -1247,7 +1247,7 @@
               <a:pPr>
                 <a:defRPr/>
               </a:pPr>
-              <a:t>9/25/24</a:t>
+              <a:t>10/8/24</a:t>
             </a:fld>
             <a:endParaRPr lang="en-US" dirty="0"/>
           </a:p>
@@ -1447,7 +1447,7 @@
               <a:pPr>
                 <a:defRPr/>
               </a:pPr>
-              <a:t>9/25/24</a:t>
+              <a:t>10/8/24</a:t>
             </a:fld>
             <a:endParaRPr lang="en-US" dirty="0"/>
           </a:p>
@@ -1725,7 +1725,7 @@
               <a:pPr>
                 <a:defRPr/>
               </a:pPr>
-              <a:t>9/25/24</a:t>
+              <a:t>10/8/24</a:t>
             </a:fld>
             <a:endParaRPr lang="en-US" dirty="0"/>
           </a:p>
@@ -1992,7 +1992,7 @@
               <a:pPr>
                 <a:defRPr/>
               </a:pPr>
-              <a:t>9/25/24</a:t>
+              <a:t>10/8/24</a:t>
             </a:fld>
             <a:endParaRPr lang="en-US" dirty="0"/>
           </a:p>
@@ -2299,7 +2299,7 @@
               <a:pPr>
                 <a:defRPr/>
               </a:pPr>
-              <a:t>9/25/24</a:t>
+              <a:t>10/8/24</a:t>
             </a:fld>
             <a:endParaRPr lang="en-US" dirty="0"/>
           </a:p>
@@ -2740,7 +2740,7 @@
               <a:pPr>
                 <a:defRPr/>
               </a:pPr>
-              <a:t>9/25/24</a:t>
+              <a:t>10/8/24</a:t>
             </a:fld>
             <a:endParaRPr lang="en-US" dirty="0"/>
           </a:p>
@@ -2879,7 +2879,7 @@
               <a:pPr>
                 <a:defRPr/>
               </a:pPr>
-              <a:t>9/25/24</a:t>
+              <a:t>10/8/24</a:t>
             </a:fld>
             <a:endParaRPr lang="en-US" dirty="0"/>
           </a:p>
@@ -2996,7 +2996,7 @@
               <a:pPr>
                 <a:defRPr/>
               </a:pPr>
-              <a:t>9/25/24</a:t>
+              <a:t>10/8/24</a:t>
             </a:fld>
             <a:endParaRPr lang="en-US" dirty="0"/>
           </a:p>
@@ -3293,7 +3293,7 @@
               <a:pPr>
                 <a:defRPr/>
               </a:pPr>
-              <a:t>9/25/24</a:t>
+              <a:t>10/8/24</a:t>
             </a:fld>
             <a:endParaRPr lang="en-US" dirty="0"/>
           </a:p>
@@ -3574,7 +3574,7 @@
               <a:pPr>
                 <a:defRPr/>
               </a:pPr>
-              <a:t>9/25/24</a:t>
+              <a:t>10/8/24</a:t>
             </a:fld>
             <a:endParaRPr lang="en-US" dirty="0"/>
           </a:p>
@@ -3865,7 +3865,7 @@
               <a:pPr>
                 <a:defRPr/>
               </a:pPr>
-              <a:t>9/25/24</a:t>
+              <a:t>10/8/24</a:t>
             </a:fld>
             <a:endParaRPr lang="en-US" dirty="0"/>
           </a:p>
@@ -4479,7 +4479,7 @@
               <a:defRPr/>
             </a:pPr>
             <a:r>
-              <a:rPr lang="en-US" sz="1400" dirty="0">
+              <a:rPr lang="en-US" sz="1300" dirty="0">
                 <a:solidFill>
                   <a:prstClr val="black"/>
                 </a:solidFill>
@@ -5102,7 +5102,7 @@
               <a:defRPr/>
             </a:pPr>
             <a:r>
-              <a:rPr lang="en-US" sz="1400" dirty="0">
+              <a:rPr lang="en-US" sz="1300" dirty="0">
                 <a:solidFill>
                   <a:prstClr val="black"/>
                 </a:solidFill>
@@ -5168,7 +5168,7 @@
               </a:spcBef>
             </a:pPr>
             <a:r>
-              <a:rPr lang="en-US" altLang="en-US" sz="1400" dirty="0">
+              <a:rPr lang="en-US" altLang="en-US" sz="1300" dirty="0">
                 <a:solidFill>
                   <a:srgbClr val="000000"/>
                 </a:solidFill>
@@ -5415,7 +5415,43 @@
                 <a:ea typeface="SimSun" panose="02010600030101010101" pitchFamily="2" charset="-122"/>
                 <a:cs typeface="Arial" panose="020B0604020202020204" pitchFamily="34" charset="0"/>
               </a:rPr>
-              <a:t>First draft generated using PAIGE, the AI assistant for generating publication highlights.</a:t>
+              <a:t>First draft generated using PAIGE, the </a:t>
+            </a:r>
+            <a:r>
+              <a:rPr lang="en-US" sz="1200" i="1" dirty="0" err="1">
+                <a:effectLst/>
+                <a:latin typeface="Calibri" panose="020F0502020204030204" pitchFamily="34" charset="0"/>
+                <a:ea typeface="SimSun" panose="02010600030101010101" pitchFamily="2" charset="-122"/>
+                <a:cs typeface="Arial" panose="020B0604020202020204" pitchFamily="34" charset="0"/>
+              </a:rPr>
+              <a:t>Pnnl</a:t>
+            </a:r>
+            <a:r>
+              <a:rPr lang="en-US" sz="1200" i="1" dirty="0">
+                <a:effectLst/>
+                <a:latin typeface="Calibri" panose="020F0502020204030204" pitchFamily="34" charset="0"/>
+                <a:ea typeface="SimSun" panose="02010600030101010101" pitchFamily="2" charset="-122"/>
+                <a:cs typeface="Arial" panose="020B0604020202020204" pitchFamily="34" charset="0"/>
+              </a:rPr>
+              <a:t> AI assistant for </a:t>
+            </a:r>
+            <a:r>
+              <a:rPr lang="en-US" sz="1200" i="1" dirty="0" err="1">
+                <a:effectLst/>
+                <a:latin typeface="Calibri" panose="020F0502020204030204" pitchFamily="34" charset="0"/>
+                <a:ea typeface="SimSun" panose="02010600030101010101" pitchFamily="2" charset="-122"/>
+                <a:cs typeface="Arial" panose="020B0604020202020204" pitchFamily="34" charset="0"/>
+              </a:rPr>
+              <a:t>GEnerating</a:t>
+            </a:r>
+            <a:r>
+              <a:rPr lang="en-US" sz="1200" i="1" dirty="0">
+                <a:effectLst/>
+                <a:latin typeface="Calibri" panose="020F0502020204030204" pitchFamily="34" charset="0"/>
+                <a:ea typeface="SimSun" panose="02010600030101010101" pitchFamily="2" charset="-122"/>
+                <a:cs typeface="Arial" panose="020B0604020202020204" pitchFamily="34" charset="0"/>
+              </a:rPr>
+              <a:t>  publication highlights</a:t>
             </a:r>
           </a:p>
         </p:txBody>
@@ -5999,31 +6035,12 @@
 </file>
 
 <file path=customXml/item1.xml><?xml version="1.0" encoding="utf-8"?>
-<p:properties xmlns:p="http://schemas.microsoft.com/office/2006/metadata/properties" xmlns:xsi="http://www.w3.org/2001/XMLSchema-instance" xmlns:pc="http://schemas.microsoft.com/office/infopath/2007/PartnerControls">
-  <documentManagement>
-    <lcf76f155ced4ddcb4097134ff3c332f xmlns="d8a9b28a-468d-4f89-a24a-ae448d085101">
-      <Terms xmlns="http://schemas.microsoft.com/office/infopath/2007/PartnerControls"/>
-    </lcf76f155ced4ddcb4097134ff3c332f>
-    <TaxCatchAll xmlns="46a18389-f917-48ab-8f10-3a1967a18774" xsi:nil="true"/>
-    <SharedWithUsers xmlns="46a18389-f917-48ab-8f10-3a1967a18774">
-      <UserInfo>
-        <DisplayName>Rice, Jennie S</DisplayName>
-        <AccountId>12</AccountId>
-        <AccountType/>
-      </UserInfo>
-      <UserInfo>
-        <DisplayName>Vernon, Chris R</DisplayName>
-        <AccountId>27</AccountId>
-        <AccountType/>
-      </UserInfo>
-      <UserInfo>
-        <DisplayName>Mcgrath, Casey R</DisplayName>
-        <AccountId>11</AccountId>
-        <AccountType/>
-      </UserInfo>
-    </SharedWithUsers>
-  </documentManagement>
-</p:properties>
+<?mso-contentType ?>
+<FormTemplates xmlns="http://schemas.microsoft.com/sharepoint/v3/contenttype/forms">
+  <Display>DocumentLibraryForm</Display>
+  <Edit>DocumentLibraryForm</Edit>
+  <New>DocumentLibraryForm</New>
+</FormTemplates>
 </file>
 
 <file path=customXml/item2.xml><?xml version="1.0" encoding="utf-8"?>
@@ -6244,27 +6261,37 @@
 </file>
 
 <file path=customXml/item3.xml><?xml version="1.0" encoding="utf-8"?>
-<?mso-contentType ?>
-<FormTemplates xmlns="http://schemas.microsoft.com/sharepoint/v3/contenttype/forms">
-  <Display>DocumentLibraryForm</Display>
-  <Edit>DocumentLibraryForm</Edit>
-  <New>DocumentLibraryForm</New>
-</FormTemplates>
+<p:properties xmlns:p="http://schemas.microsoft.com/office/2006/metadata/properties" xmlns:xsi="http://www.w3.org/2001/XMLSchema-instance" xmlns:pc="http://schemas.microsoft.com/office/infopath/2007/PartnerControls">
+  <documentManagement>
+    <lcf76f155ced4ddcb4097134ff3c332f xmlns="d8a9b28a-468d-4f89-a24a-ae448d085101">
+      <Terms xmlns="http://schemas.microsoft.com/office/infopath/2007/PartnerControls"/>
+    </lcf76f155ced4ddcb4097134ff3c332f>
+    <TaxCatchAll xmlns="46a18389-f917-48ab-8f10-3a1967a18774" xsi:nil="true"/>
+    <SharedWithUsers xmlns="46a18389-f917-48ab-8f10-3a1967a18774">
+      <UserInfo>
+        <DisplayName>Rice, Jennie S</DisplayName>
+        <AccountId>12</AccountId>
+        <AccountType/>
+      </UserInfo>
+      <UserInfo>
+        <DisplayName>Vernon, Chris R</DisplayName>
+        <AccountId>27</AccountId>
+        <AccountType/>
+      </UserInfo>
+      <UserInfo>
+        <DisplayName>Mcgrath, Casey R</DisplayName>
+        <AccountId>11</AccountId>
+        <AccountType/>
+      </UserInfo>
+    </SharedWithUsers>
+  </documentManagement>
+</p:properties>
 </file>
 
 <file path=customXml/itemProps1.xml><?xml version="1.0" encoding="utf-8"?>
-<ds:datastoreItem xmlns:ds="http://schemas.openxmlformats.org/officeDocument/2006/customXml" ds:itemID="{8A57D9F0-2B85-430B-8843-0027C0E6F07C}">
+<ds:datastoreItem xmlns:ds="http://schemas.openxmlformats.org/officeDocument/2006/customXml" ds:itemID="{2C74935E-4390-47DD-99CE-60A5373B7B50}">
   <ds:schemaRefs>
-    <ds:schemaRef ds:uri="http://www.w3.org/XML/1998/namespace"/>
-    <ds:schemaRef ds:uri="http://purl.org/dc/dcmitype/"/>
-    <ds:schemaRef ds:uri="http://purl.org/dc/elements/1.1/"/>
-    <ds:schemaRef ds:uri="d8a9b28a-468d-4f89-a24a-ae448d085101"/>
-    <ds:schemaRef ds:uri="http://purl.org/dc/terms/"/>
-    <ds:schemaRef ds:uri="http://schemas.microsoft.com/office/infopath/2007/PartnerControls"/>
-    <ds:schemaRef ds:uri="http://schemas.microsoft.com/office/2006/documentManagement/types"/>
-    <ds:schemaRef ds:uri="http://schemas.openxmlformats.org/package/2006/metadata/core-properties"/>
-    <ds:schemaRef ds:uri="46a18389-f917-48ab-8f10-3a1967a18774"/>
-    <ds:schemaRef ds:uri="http://schemas.microsoft.com/office/2006/metadata/properties"/>
+    <ds:schemaRef ds:uri="http://schemas.microsoft.com/sharepoint/v3/contenttype/forms"/>
   </ds:schemaRefs>
 </ds:datastoreItem>
 </file>
@@ -6289,9 +6316,18 @@
 </file>
 
 <file path=customXml/itemProps3.xml><?xml version="1.0" encoding="utf-8"?>
-<ds:datastoreItem xmlns:ds="http://schemas.openxmlformats.org/officeDocument/2006/customXml" ds:itemID="{2C74935E-4390-47DD-99CE-60A5373B7B50}">
+<ds:datastoreItem xmlns:ds="http://schemas.openxmlformats.org/officeDocument/2006/customXml" ds:itemID="{8A57D9F0-2B85-430B-8843-0027C0E6F07C}">
   <ds:schemaRefs>
-    <ds:schemaRef ds:uri="http://schemas.microsoft.com/sharepoint/v3/contenttype/forms"/>
+    <ds:schemaRef ds:uri="http://www.w3.org/XML/1998/namespace"/>
+    <ds:schemaRef ds:uri="http://purl.org/dc/dcmitype/"/>
+    <ds:schemaRef ds:uri="http://purl.org/dc/elements/1.1/"/>
+    <ds:schemaRef ds:uri="d8a9b28a-468d-4f89-a24a-ae448d085101"/>
+    <ds:schemaRef ds:uri="http://purl.org/dc/terms/"/>
+    <ds:schemaRef ds:uri="http://schemas.microsoft.com/office/infopath/2007/PartnerControls"/>
+    <ds:schemaRef ds:uri="http://schemas.microsoft.com/office/2006/documentManagement/types"/>
+    <ds:schemaRef ds:uri="http://schemas.openxmlformats.org/package/2006/metadata/core-properties"/>
+    <ds:schemaRef ds:uri="46a18389-f917-48ab-8f10-3a1967a18774"/>
+    <ds:schemaRef ds:uri="http://schemas.microsoft.com/office/2006/metadata/properties"/>
   </ds:schemaRefs>
 </ds:datastoreItem>
 </file>
</xml_diff>